<commit_message>
finish detailing assign grnas params
</commit_message>
<xml_diff>
--- a/nextflow_dag.pptx
+++ b/nextflow_dag.pptx
@@ -107,6 +107,11 @@
       </a:defRPr>
     </a:lvl9pPr>
   </p:defaultTextStyle>
+  <p:extLst>
+    <p:ext uri="{EFAFB233-063F-42B5-8137-9DF3F51BA10A}">
+      <p15:sldGuideLst xmlns:p15="http://schemas.microsoft.com/office/powerpoint/2012/main"/>
+    </p:ext>
+  </p:extLst>
 </p:presentation>
 </file>
 
@@ -192,7 +197,7 @@
           <a:p>
             <a:fld id="{E373F331-65B1-E645-97D4-9A54F7CC58FF}" type="datetimeFigureOut">
               <a:rPr lang="en-US" smtClean="0"/>
-              <a:t>2/2/24</a:t>
+              <a:t>2/4/24</a:t>
             </a:fld>
             <a:endParaRPr lang="en-US"/>
           </a:p>
@@ -690,7 +695,7 @@
           <a:p>
             <a:fld id="{EB407A65-2F44-944F-8579-EE1B485E3EEC}" type="datetimeFigureOut">
               <a:rPr lang="en-US" smtClean="0"/>
-              <a:t>2/2/24</a:t>
+              <a:t>2/4/24</a:t>
             </a:fld>
             <a:endParaRPr lang="en-US"/>
           </a:p>
@@ -888,7 +893,7 @@
           <a:p>
             <a:fld id="{EB407A65-2F44-944F-8579-EE1B485E3EEC}" type="datetimeFigureOut">
               <a:rPr lang="en-US" smtClean="0"/>
-              <a:t>2/2/24</a:t>
+              <a:t>2/4/24</a:t>
             </a:fld>
             <a:endParaRPr lang="en-US"/>
           </a:p>
@@ -1096,7 +1101,7 @@
           <a:p>
             <a:fld id="{EB407A65-2F44-944F-8579-EE1B485E3EEC}" type="datetimeFigureOut">
               <a:rPr lang="en-US" smtClean="0"/>
-              <a:t>2/2/24</a:t>
+              <a:t>2/4/24</a:t>
             </a:fld>
             <a:endParaRPr lang="en-US"/>
           </a:p>
@@ -1294,7 +1299,7 @@
           <a:p>
             <a:fld id="{EB407A65-2F44-944F-8579-EE1B485E3EEC}" type="datetimeFigureOut">
               <a:rPr lang="en-US" smtClean="0"/>
-              <a:t>2/2/24</a:t>
+              <a:t>2/4/24</a:t>
             </a:fld>
             <a:endParaRPr lang="en-US"/>
           </a:p>
@@ -1569,7 +1574,7 @@
           <a:p>
             <a:fld id="{EB407A65-2F44-944F-8579-EE1B485E3EEC}" type="datetimeFigureOut">
               <a:rPr lang="en-US" smtClean="0"/>
-              <a:t>2/2/24</a:t>
+              <a:t>2/4/24</a:t>
             </a:fld>
             <a:endParaRPr lang="en-US"/>
           </a:p>
@@ -1834,7 +1839,7 @@
           <a:p>
             <a:fld id="{EB407A65-2F44-944F-8579-EE1B485E3EEC}" type="datetimeFigureOut">
               <a:rPr lang="en-US" smtClean="0"/>
-              <a:t>2/2/24</a:t>
+              <a:t>2/4/24</a:t>
             </a:fld>
             <a:endParaRPr lang="en-US"/>
           </a:p>
@@ -2246,7 +2251,7 @@
           <a:p>
             <a:fld id="{EB407A65-2F44-944F-8579-EE1B485E3EEC}" type="datetimeFigureOut">
               <a:rPr lang="en-US" smtClean="0"/>
-              <a:t>2/2/24</a:t>
+              <a:t>2/4/24</a:t>
             </a:fld>
             <a:endParaRPr lang="en-US"/>
           </a:p>
@@ -2387,7 +2392,7 @@
           <a:p>
             <a:fld id="{EB407A65-2F44-944F-8579-EE1B485E3EEC}" type="datetimeFigureOut">
               <a:rPr lang="en-US" smtClean="0"/>
-              <a:t>2/2/24</a:t>
+              <a:t>2/4/24</a:t>
             </a:fld>
             <a:endParaRPr lang="en-US"/>
           </a:p>
@@ -2500,7 +2505,7 @@
           <a:p>
             <a:fld id="{EB407A65-2F44-944F-8579-EE1B485E3EEC}" type="datetimeFigureOut">
               <a:rPr lang="en-US" smtClean="0"/>
-              <a:t>2/2/24</a:t>
+              <a:t>2/4/24</a:t>
             </a:fld>
             <a:endParaRPr lang="en-US"/>
           </a:p>
@@ -2811,7 +2816,7 @@
           <a:p>
             <a:fld id="{EB407A65-2F44-944F-8579-EE1B485E3EEC}" type="datetimeFigureOut">
               <a:rPr lang="en-US" smtClean="0"/>
-              <a:t>2/2/24</a:t>
+              <a:t>2/4/24</a:t>
             </a:fld>
             <a:endParaRPr lang="en-US"/>
           </a:p>
@@ -3099,7 +3104,7 @@
           <a:p>
             <a:fld id="{EB407A65-2F44-944F-8579-EE1B485E3EEC}" type="datetimeFigureOut">
               <a:rPr lang="en-US" smtClean="0"/>
-              <a:t>2/2/24</a:t>
+              <a:t>2/4/24</a:t>
             </a:fld>
             <a:endParaRPr lang="en-US"/>
           </a:p>
@@ -3340,7 +3345,7 @@
           <a:p>
             <a:fld id="{EB407A65-2F44-944F-8579-EE1B485E3EEC}" type="datetimeFigureOut">
               <a:rPr lang="en-US" smtClean="0"/>
-              <a:t>2/2/24</a:t>
+              <a:t>2/4/24</a:t>
             </a:fld>
             <a:endParaRPr lang="en-US"/>
           </a:p>
@@ -4780,7 +4785,7 @@
                   <a:schemeClr val="tx1"/>
                 </a:solidFill>
               </a:rPr>
-              <a:t>p</a:t>
+              <a:t>r</a:t>
             </a:r>
             <a:endParaRPr lang="en-US" sz="1300" dirty="0">
               <a:solidFill>
@@ -5201,7 +5206,7 @@
                   <a:schemeClr val="tx1"/>
                 </a:solidFill>
               </a:rPr>
-              <a:t>p</a:t>
+              <a:t>r</a:t>
             </a:r>
           </a:p>
         </p:txBody>
@@ -5862,8 +5867,21 @@
                   <a:schemeClr val="tx1"/>
                 </a:solidFill>
               </a:rPr>
-              <a:t>Discovery analysis 4</a:t>
-            </a:r>
+              <a:t>Discovery analysis </a:t>
+            </a:r>
+            <a:r>
+              <a:rPr lang="en-US" sz="1300" i="1" dirty="0">
+                <a:solidFill>
+                  <a:schemeClr val="tx1"/>
+                </a:solidFill>
+              </a:rPr>
+              <a:t>r</a:t>
+            </a:r>
+            <a:endParaRPr lang="en-US" sz="1300" dirty="0">
+              <a:solidFill>
+                <a:schemeClr val="tx1"/>
+              </a:solidFill>
+            </a:endParaRPr>
           </a:p>
         </p:txBody>
       </p:sp>

</xml_diff>

<commit_message>
finish draft of part II of book
</commit_message>
<xml_diff>
--- a/nextflow_dag.pptx
+++ b/nextflow_dag.pptx
@@ -5,10 +5,11 @@
     <p:sldMasterId id="2147483648" r:id="rId1"/>
   </p:sldMasterIdLst>
   <p:notesMasterIdLst>
-    <p:notesMasterId r:id="rId3"/>
+    <p:notesMasterId r:id="rId4"/>
   </p:notesMasterIdLst>
   <p:sldIdLst>
     <p:sldId id="256" r:id="rId2"/>
+    <p:sldId id="257" r:id="rId3"/>
   </p:sldIdLst>
   <p:sldSz cx="12192000" cy="6858000"/>
   <p:notesSz cx="6858000" cy="9144000"/>
@@ -197,7 +198,7 @@
           <a:p>
             <a:fld id="{E373F331-65B1-E645-97D4-9A54F7CC58FF}" type="datetimeFigureOut">
               <a:rPr lang="en-US" smtClean="0"/>
-              <a:t>2/7/24</a:t>
+              <a:t>2/19/24</a:t>
             </a:fld>
             <a:endParaRPr lang="en-US"/>
           </a:p>
@@ -548,6 +549,90 @@
 </p:notes>
 </file>
 
+<file path=ppt/notesSlides/notesSlide2.xml><?xml version="1.0" encoding="utf-8"?>
+<p:notes xmlns:a="http://schemas.openxmlformats.org/drawingml/2006/main" xmlns:r="http://schemas.openxmlformats.org/officeDocument/2006/relationships" xmlns:p="http://schemas.openxmlformats.org/presentationml/2006/main">
+  <p:cSld>
+    <p:spTree>
+      <p:nvGrpSpPr>
+        <p:cNvPr id="1" name=""/>
+        <p:cNvGrpSpPr/>
+        <p:nvPr/>
+      </p:nvGrpSpPr>
+      <p:grpSpPr>
+        <a:xfrm>
+          <a:off x="0" y="0"/>
+          <a:ext cx="0" cy="0"/>
+          <a:chOff x="0" y="0"/>
+          <a:chExt cx="0" cy="0"/>
+        </a:xfrm>
+      </p:grpSpPr>
+      <p:sp>
+        <p:nvSpPr>
+          <p:cNvPr id="2" name="Slide Image Placeholder 1"/>
+          <p:cNvSpPr>
+            <a:spLocks noGrp="1" noRot="1" noChangeAspect="1"/>
+          </p:cNvSpPr>
+          <p:nvPr>
+            <p:ph type="sldImg"/>
+          </p:nvPr>
+        </p:nvSpPr>
+        <p:spPr/>
+      </p:sp>
+      <p:sp>
+        <p:nvSpPr>
+          <p:cNvPr id="3" name="Notes Placeholder 2"/>
+          <p:cNvSpPr>
+            <a:spLocks noGrp="1"/>
+          </p:cNvSpPr>
+          <p:nvPr>
+            <p:ph type="body" idx="1"/>
+          </p:nvPr>
+        </p:nvSpPr>
+        <p:spPr/>
+        <p:txBody>
+          <a:bodyPr/>
+          <a:lstStyle/>
+          <a:p>
+            <a:endParaRPr lang="en-US" dirty="0"/>
+          </a:p>
+        </p:txBody>
+      </p:sp>
+      <p:sp>
+        <p:nvSpPr>
+          <p:cNvPr id="4" name="Slide Number Placeholder 3"/>
+          <p:cNvSpPr>
+            <a:spLocks noGrp="1"/>
+          </p:cNvSpPr>
+          <p:nvPr>
+            <p:ph type="sldNum" sz="quarter" idx="5"/>
+          </p:nvPr>
+        </p:nvSpPr>
+        <p:spPr/>
+        <p:txBody>
+          <a:bodyPr/>
+          <a:lstStyle/>
+          <a:p>
+            <a:fld id="{7286F07F-620B-E34A-8172-6B326FD28762}" type="slidenum">
+              <a:rPr lang="en-US" smtClean="0"/>
+              <a:t>2</a:t>
+            </a:fld>
+            <a:endParaRPr lang="en-US"/>
+          </a:p>
+        </p:txBody>
+      </p:sp>
+    </p:spTree>
+    <p:extLst>
+      <p:ext uri="{BB962C8B-B14F-4D97-AF65-F5344CB8AC3E}">
+        <p14:creationId xmlns:p14="http://schemas.microsoft.com/office/powerpoint/2010/main" val="3826506870"/>
+      </p:ext>
+    </p:extLst>
+  </p:cSld>
+  <p:clrMapOvr>
+    <a:masterClrMapping/>
+  </p:clrMapOvr>
+</p:notes>
+</file>
+
 <file path=ppt/slideLayouts/slideLayout1.xml><?xml version="1.0" encoding="utf-8"?>
 <p:sldLayout xmlns:a="http://schemas.openxmlformats.org/drawingml/2006/main" xmlns:r="http://schemas.openxmlformats.org/officeDocument/2006/relationships" xmlns:p="http://schemas.openxmlformats.org/presentationml/2006/main" type="title" preserve="1">
   <p:cSld name="Title Slide">
@@ -695,7 +780,7 @@
           <a:p>
             <a:fld id="{EB407A65-2F44-944F-8579-EE1B485E3EEC}" type="datetimeFigureOut">
               <a:rPr lang="en-US" smtClean="0"/>
-              <a:t>2/7/24</a:t>
+              <a:t>2/19/24</a:t>
             </a:fld>
             <a:endParaRPr lang="en-US"/>
           </a:p>
@@ -893,7 +978,7 @@
           <a:p>
             <a:fld id="{EB407A65-2F44-944F-8579-EE1B485E3EEC}" type="datetimeFigureOut">
               <a:rPr lang="en-US" smtClean="0"/>
-              <a:t>2/7/24</a:t>
+              <a:t>2/19/24</a:t>
             </a:fld>
             <a:endParaRPr lang="en-US"/>
           </a:p>
@@ -1101,7 +1186,7 @@
           <a:p>
             <a:fld id="{EB407A65-2F44-944F-8579-EE1B485E3EEC}" type="datetimeFigureOut">
               <a:rPr lang="en-US" smtClean="0"/>
-              <a:t>2/7/24</a:t>
+              <a:t>2/19/24</a:t>
             </a:fld>
             <a:endParaRPr lang="en-US"/>
           </a:p>
@@ -1299,7 +1384,7 @@
           <a:p>
             <a:fld id="{EB407A65-2F44-944F-8579-EE1B485E3EEC}" type="datetimeFigureOut">
               <a:rPr lang="en-US" smtClean="0"/>
-              <a:t>2/7/24</a:t>
+              <a:t>2/19/24</a:t>
             </a:fld>
             <a:endParaRPr lang="en-US"/>
           </a:p>
@@ -1574,7 +1659,7 @@
           <a:p>
             <a:fld id="{EB407A65-2F44-944F-8579-EE1B485E3EEC}" type="datetimeFigureOut">
               <a:rPr lang="en-US" smtClean="0"/>
-              <a:t>2/7/24</a:t>
+              <a:t>2/19/24</a:t>
             </a:fld>
             <a:endParaRPr lang="en-US"/>
           </a:p>
@@ -1839,7 +1924,7 @@
           <a:p>
             <a:fld id="{EB407A65-2F44-944F-8579-EE1B485E3EEC}" type="datetimeFigureOut">
               <a:rPr lang="en-US" smtClean="0"/>
-              <a:t>2/7/24</a:t>
+              <a:t>2/19/24</a:t>
             </a:fld>
             <a:endParaRPr lang="en-US"/>
           </a:p>
@@ -2251,7 +2336,7 @@
           <a:p>
             <a:fld id="{EB407A65-2F44-944F-8579-EE1B485E3EEC}" type="datetimeFigureOut">
               <a:rPr lang="en-US" smtClean="0"/>
-              <a:t>2/7/24</a:t>
+              <a:t>2/19/24</a:t>
             </a:fld>
             <a:endParaRPr lang="en-US"/>
           </a:p>
@@ -2392,7 +2477,7 @@
           <a:p>
             <a:fld id="{EB407A65-2F44-944F-8579-EE1B485E3EEC}" type="datetimeFigureOut">
               <a:rPr lang="en-US" smtClean="0"/>
-              <a:t>2/7/24</a:t>
+              <a:t>2/19/24</a:t>
             </a:fld>
             <a:endParaRPr lang="en-US"/>
           </a:p>
@@ -2505,7 +2590,7 @@
           <a:p>
             <a:fld id="{EB407A65-2F44-944F-8579-EE1B485E3EEC}" type="datetimeFigureOut">
               <a:rPr lang="en-US" smtClean="0"/>
-              <a:t>2/7/24</a:t>
+              <a:t>2/19/24</a:t>
             </a:fld>
             <a:endParaRPr lang="en-US"/>
           </a:p>
@@ -2816,7 +2901,7 @@
           <a:p>
             <a:fld id="{EB407A65-2F44-944F-8579-EE1B485E3EEC}" type="datetimeFigureOut">
               <a:rPr lang="en-US" smtClean="0"/>
-              <a:t>2/7/24</a:t>
+              <a:t>2/19/24</a:t>
             </a:fld>
             <a:endParaRPr lang="en-US"/>
           </a:p>
@@ -3104,7 +3189,7 @@
           <a:p>
             <a:fld id="{EB407A65-2F44-944F-8579-EE1B485E3EEC}" type="datetimeFigureOut">
               <a:rPr lang="en-US" smtClean="0"/>
-              <a:t>2/7/24</a:t>
+              <a:t>2/19/24</a:t>
             </a:fld>
             <a:endParaRPr lang="en-US"/>
           </a:p>
@@ -3345,7 +3430,7 @@
           <a:p>
             <a:fld id="{EB407A65-2F44-944F-8579-EE1B485E3EEC}" type="datetimeFigureOut">
               <a:rPr lang="en-US" smtClean="0"/>
-              <a:t>2/7/24</a:t>
+              <a:t>2/19/24</a:t>
             </a:fld>
             <a:endParaRPr lang="en-US"/>
           </a:p>
@@ -7425,6 +7510,1800 @@
     <p:extLst>
       <p:ext uri="{BB962C8B-B14F-4D97-AF65-F5344CB8AC3E}">
         <p14:creationId xmlns:p14="http://schemas.microsoft.com/office/powerpoint/2010/main" val="1148280136"/>
+      </p:ext>
+    </p:extLst>
+  </p:cSld>
+  <p:clrMapOvr>
+    <a:masterClrMapping/>
+  </p:clrMapOvr>
+</p:sld>
+</file>
+
+<file path=ppt/slides/slide2.xml><?xml version="1.0" encoding="utf-8"?>
+<p:sld xmlns:a="http://schemas.openxmlformats.org/drawingml/2006/main" xmlns:r="http://schemas.openxmlformats.org/officeDocument/2006/relationships" xmlns:p="http://schemas.openxmlformats.org/presentationml/2006/main">
+  <p:cSld>
+    <p:spTree>
+      <p:nvGrpSpPr>
+        <p:cNvPr id="1" name=""/>
+        <p:cNvGrpSpPr/>
+        <p:nvPr/>
+      </p:nvGrpSpPr>
+      <p:grpSpPr>
+        <a:xfrm>
+          <a:off x="0" y="0"/>
+          <a:ext cx="0" cy="0"/>
+          <a:chOff x="0" y="0"/>
+          <a:chExt cx="0" cy="0"/>
+        </a:xfrm>
+      </p:grpSpPr>
+      <p:sp>
+        <p:nvSpPr>
+          <p:cNvPr id="7" name="Rectangle 6">
+            <a:extLst>
+              <a:ext uri="{FF2B5EF4-FFF2-40B4-BE49-F238E27FC236}">
+                <a16:creationId xmlns:a16="http://schemas.microsoft.com/office/drawing/2014/main" id="{14AB0DF9-B98B-28AC-547C-848BA2ACBCC7}"/>
+              </a:ext>
+            </a:extLst>
+          </p:cNvPr>
+          <p:cNvSpPr/>
+          <p:nvPr/>
+        </p:nvSpPr>
+        <p:spPr>
+          <a:xfrm>
+            <a:off x="2261751" y="612711"/>
+            <a:ext cx="1542591" cy="559293"/>
+          </a:xfrm>
+          <a:prstGeom prst="rect">
+            <a:avLst/>
+          </a:prstGeom>
+          <a:solidFill>
+            <a:srgbClr val="00B0F0"/>
+          </a:solidFill>
+          <a:ln w="9525"/>
+        </p:spPr>
+        <p:style>
+          <a:lnRef idx="2">
+            <a:schemeClr val="accent1">
+              <a:shade val="15000"/>
+            </a:schemeClr>
+          </a:lnRef>
+          <a:fillRef idx="1">
+            <a:schemeClr val="accent1"/>
+          </a:fillRef>
+          <a:effectRef idx="0">
+            <a:schemeClr val="accent1"/>
+          </a:effectRef>
+          <a:fontRef idx="minor">
+            <a:schemeClr val="lt1"/>
+          </a:fontRef>
+        </p:style>
+        <p:txBody>
+          <a:bodyPr rtlCol="0" anchor="ctr"/>
+          <a:lstStyle/>
+          <a:p>
+            <a:pPr algn="ctr"/>
+            <a:r>
+              <a:rPr lang="en-US" sz="1300" dirty="0">
+                <a:solidFill>
+                  <a:schemeClr val="tx1"/>
+                </a:solidFill>
+              </a:rPr>
+              <a:t>Set analysis parameters</a:t>
+            </a:r>
+          </a:p>
+        </p:txBody>
+      </p:sp>
+      <p:sp>
+        <p:nvSpPr>
+          <p:cNvPr id="10" name="Rectangle 9">
+            <a:extLst>
+              <a:ext uri="{FF2B5EF4-FFF2-40B4-BE49-F238E27FC236}">
+                <a16:creationId xmlns:a16="http://schemas.microsoft.com/office/drawing/2014/main" id="{80F056DE-C406-5448-F60A-D51E562938CD}"/>
+              </a:ext>
+            </a:extLst>
+          </p:cNvPr>
+          <p:cNvSpPr/>
+          <p:nvPr/>
+        </p:nvSpPr>
+        <p:spPr>
+          <a:xfrm>
+            <a:off x="6357883" y="51716"/>
+            <a:ext cx="1542591" cy="279509"/>
+          </a:xfrm>
+          <a:prstGeom prst="rect">
+            <a:avLst/>
+          </a:prstGeom>
+          <a:solidFill>
+            <a:srgbClr val="00B0F0"/>
+          </a:solidFill>
+          <a:ln w="9525"/>
+        </p:spPr>
+        <p:style>
+          <a:lnRef idx="2">
+            <a:schemeClr val="accent1">
+              <a:shade val="15000"/>
+            </a:schemeClr>
+          </a:lnRef>
+          <a:fillRef idx="1">
+            <a:schemeClr val="accent1"/>
+          </a:fillRef>
+          <a:effectRef idx="0">
+            <a:schemeClr val="accent1"/>
+          </a:effectRef>
+          <a:fontRef idx="minor">
+            <a:schemeClr val="lt1"/>
+          </a:fontRef>
+        </p:style>
+        <p:txBody>
+          <a:bodyPr rtlCol="0" anchor="ctr"/>
+          <a:lstStyle/>
+          <a:p>
+            <a:pPr algn="ctr"/>
+            <a:r>
+              <a:rPr lang="en-US" sz="1300" dirty="0">
+                <a:solidFill>
+                  <a:schemeClr val="tx1"/>
+                </a:solidFill>
+              </a:rPr>
+              <a:t>Assign gRNAs 1</a:t>
+            </a:r>
+          </a:p>
+        </p:txBody>
+      </p:sp>
+      <p:sp>
+        <p:nvSpPr>
+          <p:cNvPr id="11" name="Rectangle 10">
+            <a:extLst>
+              <a:ext uri="{FF2B5EF4-FFF2-40B4-BE49-F238E27FC236}">
+                <a16:creationId xmlns:a16="http://schemas.microsoft.com/office/drawing/2014/main" id="{93115D63-63A9-F982-6188-ADED336BD406}"/>
+              </a:ext>
+            </a:extLst>
+          </p:cNvPr>
+          <p:cNvSpPr/>
+          <p:nvPr/>
+        </p:nvSpPr>
+        <p:spPr>
+          <a:xfrm>
+            <a:off x="6357883" y="401064"/>
+            <a:ext cx="1542591" cy="279509"/>
+          </a:xfrm>
+          <a:prstGeom prst="rect">
+            <a:avLst/>
+          </a:prstGeom>
+          <a:solidFill>
+            <a:srgbClr val="00B0F0"/>
+          </a:solidFill>
+          <a:ln w="9525"/>
+        </p:spPr>
+        <p:style>
+          <a:lnRef idx="2">
+            <a:schemeClr val="accent1">
+              <a:shade val="15000"/>
+            </a:schemeClr>
+          </a:lnRef>
+          <a:fillRef idx="1">
+            <a:schemeClr val="accent1"/>
+          </a:fillRef>
+          <a:effectRef idx="0">
+            <a:schemeClr val="accent1"/>
+          </a:effectRef>
+          <a:fontRef idx="minor">
+            <a:schemeClr val="lt1"/>
+          </a:fontRef>
+        </p:style>
+        <p:txBody>
+          <a:bodyPr rtlCol="0" anchor="ctr"/>
+          <a:lstStyle/>
+          <a:p>
+            <a:pPr algn="ctr"/>
+            <a:r>
+              <a:rPr lang="en-US" sz="1300" dirty="0">
+                <a:solidFill>
+                  <a:schemeClr val="tx1"/>
+                </a:solidFill>
+              </a:rPr>
+              <a:t>Assign gRNAs 2</a:t>
+            </a:r>
+          </a:p>
+        </p:txBody>
+      </p:sp>
+      <p:sp>
+        <p:nvSpPr>
+          <p:cNvPr id="12" name="Rectangle 11">
+            <a:extLst>
+              <a:ext uri="{FF2B5EF4-FFF2-40B4-BE49-F238E27FC236}">
+                <a16:creationId xmlns:a16="http://schemas.microsoft.com/office/drawing/2014/main" id="{E5C2ED77-A9D3-51C4-1525-3C4225A355F3}"/>
+              </a:ext>
+            </a:extLst>
+          </p:cNvPr>
+          <p:cNvSpPr/>
+          <p:nvPr/>
+        </p:nvSpPr>
+        <p:spPr>
+          <a:xfrm>
+            <a:off x="6357883" y="750412"/>
+            <a:ext cx="1542591" cy="279509"/>
+          </a:xfrm>
+          <a:prstGeom prst="rect">
+            <a:avLst/>
+          </a:prstGeom>
+          <a:solidFill>
+            <a:srgbClr val="00B0F0"/>
+          </a:solidFill>
+          <a:ln w="9525"/>
+        </p:spPr>
+        <p:style>
+          <a:lnRef idx="2">
+            <a:schemeClr val="accent1">
+              <a:shade val="15000"/>
+            </a:schemeClr>
+          </a:lnRef>
+          <a:fillRef idx="1">
+            <a:schemeClr val="accent1"/>
+          </a:fillRef>
+          <a:effectRef idx="0">
+            <a:schemeClr val="accent1"/>
+          </a:effectRef>
+          <a:fontRef idx="minor">
+            <a:schemeClr val="lt1"/>
+          </a:fontRef>
+        </p:style>
+        <p:txBody>
+          <a:bodyPr rtlCol="0" anchor="ctr"/>
+          <a:lstStyle/>
+          <a:p>
+            <a:pPr algn="ctr"/>
+            <a:r>
+              <a:rPr lang="en-US" sz="1300" dirty="0">
+                <a:solidFill>
+                  <a:schemeClr val="tx1"/>
+                </a:solidFill>
+              </a:rPr>
+              <a:t>Assign gRNAs 3</a:t>
+            </a:r>
+          </a:p>
+        </p:txBody>
+      </p:sp>
+      <p:sp>
+        <p:nvSpPr>
+          <p:cNvPr id="13" name="Rectangle 12">
+            <a:extLst>
+              <a:ext uri="{FF2B5EF4-FFF2-40B4-BE49-F238E27FC236}">
+                <a16:creationId xmlns:a16="http://schemas.microsoft.com/office/drawing/2014/main" id="{23B60E4E-5D3C-A4B4-AD3B-DD76DFCF5F22}"/>
+              </a:ext>
+            </a:extLst>
+          </p:cNvPr>
+          <p:cNvSpPr/>
+          <p:nvPr/>
+        </p:nvSpPr>
+        <p:spPr>
+          <a:xfrm>
+            <a:off x="6357883" y="1451452"/>
+            <a:ext cx="1542591" cy="279509"/>
+          </a:xfrm>
+          <a:prstGeom prst="rect">
+            <a:avLst/>
+          </a:prstGeom>
+          <a:solidFill>
+            <a:srgbClr val="00B0F0"/>
+          </a:solidFill>
+          <a:ln w="9525"/>
+        </p:spPr>
+        <p:style>
+          <a:lnRef idx="2">
+            <a:schemeClr val="accent1">
+              <a:shade val="15000"/>
+            </a:schemeClr>
+          </a:lnRef>
+          <a:fillRef idx="1">
+            <a:schemeClr val="accent1"/>
+          </a:fillRef>
+          <a:effectRef idx="0">
+            <a:schemeClr val="accent1"/>
+          </a:effectRef>
+          <a:fontRef idx="minor">
+            <a:schemeClr val="lt1"/>
+          </a:fontRef>
+        </p:style>
+        <p:txBody>
+          <a:bodyPr rtlCol="0" anchor="ctr"/>
+          <a:lstStyle/>
+          <a:p>
+            <a:pPr algn="ctr"/>
+            <a:r>
+              <a:rPr lang="en-US" sz="1300" dirty="0">
+                <a:solidFill>
+                  <a:schemeClr val="tx1"/>
+                </a:solidFill>
+              </a:rPr>
+              <a:t>Assign gRNAs </a:t>
+            </a:r>
+            <a:r>
+              <a:rPr lang="en-US" sz="1300" i="1" dirty="0">
+                <a:solidFill>
+                  <a:schemeClr val="tx1"/>
+                </a:solidFill>
+              </a:rPr>
+              <a:t>p</a:t>
+            </a:r>
+          </a:p>
+        </p:txBody>
+      </p:sp>
+      <p:sp>
+        <p:nvSpPr>
+          <p:cNvPr id="15" name="Rectangle 14">
+            <a:extLst>
+              <a:ext uri="{FF2B5EF4-FFF2-40B4-BE49-F238E27FC236}">
+                <a16:creationId xmlns:a16="http://schemas.microsoft.com/office/drawing/2014/main" id="{094C68E9-FCFC-1871-3CD6-D7965AE4ECA9}"/>
+              </a:ext>
+            </a:extLst>
+          </p:cNvPr>
+          <p:cNvSpPr/>
+          <p:nvPr/>
+        </p:nvSpPr>
+        <p:spPr>
+          <a:xfrm>
+            <a:off x="8347197" y="610518"/>
+            <a:ext cx="1542591" cy="559293"/>
+          </a:xfrm>
+          <a:prstGeom prst="rect">
+            <a:avLst/>
+          </a:prstGeom>
+          <a:solidFill>
+            <a:srgbClr val="00B0F0"/>
+          </a:solidFill>
+          <a:ln w="9525"/>
+        </p:spPr>
+        <p:style>
+          <a:lnRef idx="2">
+            <a:schemeClr val="accent1">
+              <a:shade val="15000"/>
+            </a:schemeClr>
+          </a:lnRef>
+          <a:fillRef idx="1">
+            <a:schemeClr val="accent1"/>
+          </a:fillRef>
+          <a:effectRef idx="0">
+            <a:schemeClr val="accent1"/>
+          </a:effectRef>
+          <a:fontRef idx="minor">
+            <a:schemeClr val="lt1"/>
+          </a:fontRef>
+        </p:style>
+        <p:txBody>
+          <a:bodyPr rtlCol="0" anchor="ctr"/>
+          <a:lstStyle/>
+          <a:p>
+            <a:pPr algn="ctr"/>
+            <a:r>
+              <a:rPr lang="en-US" sz="1300" dirty="0">
+                <a:solidFill>
+                  <a:schemeClr val="tx1"/>
+                </a:solidFill>
+              </a:rPr>
+              <a:t>Combine gRNA assignments</a:t>
+            </a:r>
+          </a:p>
+        </p:txBody>
+      </p:sp>
+      <p:cxnSp>
+        <p:nvCxnSpPr>
+          <p:cNvPr id="17" name="Straight Connector 16">
+            <a:extLst>
+              <a:ext uri="{FF2B5EF4-FFF2-40B4-BE49-F238E27FC236}">
+                <a16:creationId xmlns:a16="http://schemas.microsoft.com/office/drawing/2014/main" id="{FF81D036-0D23-9958-9FCF-C0979A7522E0}"/>
+              </a:ext>
+            </a:extLst>
+          </p:cNvPr>
+          <p:cNvCxnSpPr>
+            <a:cxnSpLocks/>
+            <a:stCxn id="38" idx="3"/>
+            <a:endCxn id="10" idx="1"/>
+          </p:cNvCxnSpPr>
+          <p:nvPr/>
+        </p:nvCxnSpPr>
+        <p:spPr>
+          <a:xfrm flipV="1">
+            <a:off x="5741578" y="191471"/>
+            <a:ext cx="616305" cy="699087"/>
+          </a:xfrm>
+          <a:prstGeom prst="line">
+            <a:avLst/>
+          </a:prstGeom>
+          <a:ln w="9525">
+            <a:tailEnd type="triangle"/>
+          </a:ln>
+        </p:spPr>
+        <p:style>
+          <a:lnRef idx="1">
+            <a:schemeClr val="dk1"/>
+          </a:lnRef>
+          <a:fillRef idx="0">
+            <a:schemeClr val="dk1"/>
+          </a:fillRef>
+          <a:effectRef idx="0">
+            <a:schemeClr val="dk1"/>
+          </a:effectRef>
+          <a:fontRef idx="minor">
+            <a:schemeClr val="tx1"/>
+          </a:fontRef>
+        </p:style>
+      </p:cxnSp>
+      <p:cxnSp>
+        <p:nvCxnSpPr>
+          <p:cNvPr id="18" name="Straight Connector 17">
+            <a:extLst>
+              <a:ext uri="{FF2B5EF4-FFF2-40B4-BE49-F238E27FC236}">
+                <a16:creationId xmlns:a16="http://schemas.microsoft.com/office/drawing/2014/main" id="{02669A2A-4047-2C69-D6DC-EA495BEAB040}"/>
+              </a:ext>
+            </a:extLst>
+          </p:cNvPr>
+          <p:cNvCxnSpPr>
+            <a:cxnSpLocks/>
+            <a:stCxn id="38" idx="3"/>
+            <a:endCxn id="11" idx="1"/>
+          </p:cNvCxnSpPr>
+          <p:nvPr/>
+        </p:nvCxnSpPr>
+        <p:spPr>
+          <a:xfrm flipV="1">
+            <a:off x="5741578" y="540819"/>
+            <a:ext cx="616305" cy="349739"/>
+          </a:xfrm>
+          <a:prstGeom prst="line">
+            <a:avLst/>
+          </a:prstGeom>
+          <a:ln w="9525">
+            <a:tailEnd type="triangle"/>
+          </a:ln>
+        </p:spPr>
+        <p:style>
+          <a:lnRef idx="1">
+            <a:schemeClr val="dk1"/>
+          </a:lnRef>
+          <a:fillRef idx="0">
+            <a:schemeClr val="dk1"/>
+          </a:fillRef>
+          <a:effectRef idx="0">
+            <a:schemeClr val="dk1"/>
+          </a:effectRef>
+          <a:fontRef idx="minor">
+            <a:schemeClr val="tx1"/>
+          </a:fontRef>
+        </p:style>
+      </p:cxnSp>
+      <p:cxnSp>
+        <p:nvCxnSpPr>
+          <p:cNvPr id="21" name="Straight Connector 20">
+            <a:extLst>
+              <a:ext uri="{FF2B5EF4-FFF2-40B4-BE49-F238E27FC236}">
+                <a16:creationId xmlns:a16="http://schemas.microsoft.com/office/drawing/2014/main" id="{0ABC8E22-BA73-7F3A-84D4-2A81FEEFC5AA}"/>
+              </a:ext>
+            </a:extLst>
+          </p:cNvPr>
+          <p:cNvCxnSpPr>
+            <a:cxnSpLocks/>
+            <a:stCxn id="38" idx="3"/>
+            <a:endCxn id="12" idx="1"/>
+          </p:cNvCxnSpPr>
+          <p:nvPr/>
+        </p:nvCxnSpPr>
+        <p:spPr>
+          <a:xfrm flipV="1">
+            <a:off x="5741578" y="890167"/>
+            <a:ext cx="616305" cy="391"/>
+          </a:xfrm>
+          <a:prstGeom prst="line">
+            <a:avLst/>
+          </a:prstGeom>
+          <a:ln w="9525">
+            <a:tailEnd type="triangle"/>
+          </a:ln>
+        </p:spPr>
+        <p:style>
+          <a:lnRef idx="1">
+            <a:schemeClr val="dk1"/>
+          </a:lnRef>
+          <a:fillRef idx="0">
+            <a:schemeClr val="dk1"/>
+          </a:fillRef>
+          <a:effectRef idx="0">
+            <a:schemeClr val="dk1"/>
+          </a:effectRef>
+          <a:fontRef idx="minor">
+            <a:schemeClr val="tx1"/>
+          </a:fontRef>
+        </p:style>
+      </p:cxnSp>
+      <p:cxnSp>
+        <p:nvCxnSpPr>
+          <p:cNvPr id="24" name="Straight Connector 23">
+            <a:extLst>
+              <a:ext uri="{FF2B5EF4-FFF2-40B4-BE49-F238E27FC236}">
+                <a16:creationId xmlns:a16="http://schemas.microsoft.com/office/drawing/2014/main" id="{A1E68BBE-8524-C432-239B-EF70B44CB8C5}"/>
+              </a:ext>
+            </a:extLst>
+          </p:cNvPr>
+          <p:cNvCxnSpPr>
+            <a:cxnSpLocks/>
+            <a:stCxn id="38" idx="3"/>
+            <a:endCxn id="13" idx="1"/>
+          </p:cNvCxnSpPr>
+          <p:nvPr/>
+        </p:nvCxnSpPr>
+        <p:spPr>
+          <a:xfrm>
+            <a:off x="5741578" y="890558"/>
+            <a:ext cx="616305" cy="700649"/>
+          </a:xfrm>
+          <a:prstGeom prst="line">
+            <a:avLst/>
+          </a:prstGeom>
+          <a:ln w="9525">
+            <a:tailEnd type="triangle"/>
+          </a:ln>
+        </p:spPr>
+        <p:style>
+          <a:lnRef idx="1">
+            <a:schemeClr val="dk1"/>
+          </a:lnRef>
+          <a:fillRef idx="0">
+            <a:schemeClr val="dk1"/>
+          </a:fillRef>
+          <a:effectRef idx="0">
+            <a:schemeClr val="dk1"/>
+          </a:effectRef>
+          <a:fontRef idx="minor">
+            <a:schemeClr val="tx1"/>
+          </a:fontRef>
+        </p:style>
+      </p:cxnSp>
+      <p:cxnSp>
+        <p:nvCxnSpPr>
+          <p:cNvPr id="27" name="Straight Connector 26">
+            <a:extLst>
+              <a:ext uri="{FF2B5EF4-FFF2-40B4-BE49-F238E27FC236}">
+                <a16:creationId xmlns:a16="http://schemas.microsoft.com/office/drawing/2014/main" id="{5CC9A41B-F57A-2BF9-8348-F5DD6A21BAAB}"/>
+              </a:ext>
+            </a:extLst>
+          </p:cNvPr>
+          <p:cNvCxnSpPr>
+            <a:cxnSpLocks/>
+            <a:stCxn id="13" idx="3"/>
+            <a:endCxn id="15" idx="1"/>
+          </p:cNvCxnSpPr>
+          <p:nvPr/>
+        </p:nvCxnSpPr>
+        <p:spPr>
+          <a:xfrm flipV="1">
+            <a:off x="7900474" y="890165"/>
+            <a:ext cx="446723" cy="701042"/>
+          </a:xfrm>
+          <a:prstGeom prst="line">
+            <a:avLst/>
+          </a:prstGeom>
+          <a:ln w="9525"/>
+        </p:spPr>
+        <p:style>
+          <a:lnRef idx="1">
+            <a:schemeClr val="dk1"/>
+          </a:lnRef>
+          <a:fillRef idx="0">
+            <a:schemeClr val="dk1"/>
+          </a:fillRef>
+          <a:effectRef idx="0">
+            <a:schemeClr val="dk1"/>
+          </a:effectRef>
+          <a:fontRef idx="minor">
+            <a:schemeClr val="tx1"/>
+          </a:fontRef>
+        </p:style>
+      </p:cxnSp>
+      <p:cxnSp>
+        <p:nvCxnSpPr>
+          <p:cNvPr id="30" name="Straight Connector 29">
+            <a:extLst>
+              <a:ext uri="{FF2B5EF4-FFF2-40B4-BE49-F238E27FC236}">
+                <a16:creationId xmlns:a16="http://schemas.microsoft.com/office/drawing/2014/main" id="{BB5D01B5-CB1D-4602-729E-0FE561D1C0AC}"/>
+              </a:ext>
+            </a:extLst>
+          </p:cNvPr>
+          <p:cNvCxnSpPr>
+            <a:cxnSpLocks/>
+            <a:stCxn id="12" idx="3"/>
+            <a:endCxn id="15" idx="1"/>
+          </p:cNvCxnSpPr>
+          <p:nvPr/>
+        </p:nvCxnSpPr>
+        <p:spPr>
+          <a:xfrm flipV="1">
+            <a:off x="7900474" y="890165"/>
+            <a:ext cx="446723" cy="2"/>
+          </a:xfrm>
+          <a:prstGeom prst="line">
+            <a:avLst/>
+          </a:prstGeom>
+          <a:ln w="9525"/>
+        </p:spPr>
+        <p:style>
+          <a:lnRef idx="1">
+            <a:schemeClr val="dk1"/>
+          </a:lnRef>
+          <a:fillRef idx="0">
+            <a:schemeClr val="dk1"/>
+          </a:fillRef>
+          <a:effectRef idx="0">
+            <a:schemeClr val="dk1"/>
+          </a:effectRef>
+          <a:fontRef idx="minor">
+            <a:schemeClr val="tx1"/>
+          </a:fontRef>
+        </p:style>
+      </p:cxnSp>
+      <p:cxnSp>
+        <p:nvCxnSpPr>
+          <p:cNvPr id="33" name="Straight Connector 32">
+            <a:extLst>
+              <a:ext uri="{FF2B5EF4-FFF2-40B4-BE49-F238E27FC236}">
+                <a16:creationId xmlns:a16="http://schemas.microsoft.com/office/drawing/2014/main" id="{877A7992-0D47-7424-129C-32000E6A77C8}"/>
+              </a:ext>
+            </a:extLst>
+          </p:cNvPr>
+          <p:cNvCxnSpPr>
+            <a:cxnSpLocks/>
+            <a:stCxn id="11" idx="3"/>
+            <a:endCxn id="15" idx="1"/>
+          </p:cNvCxnSpPr>
+          <p:nvPr/>
+        </p:nvCxnSpPr>
+        <p:spPr>
+          <a:xfrm>
+            <a:off x="7900474" y="540819"/>
+            <a:ext cx="446723" cy="349346"/>
+          </a:xfrm>
+          <a:prstGeom prst="line">
+            <a:avLst/>
+          </a:prstGeom>
+          <a:ln w="9525"/>
+        </p:spPr>
+        <p:style>
+          <a:lnRef idx="1">
+            <a:schemeClr val="dk1"/>
+          </a:lnRef>
+          <a:fillRef idx="0">
+            <a:schemeClr val="dk1"/>
+          </a:fillRef>
+          <a:effectRef idx="0">
+            <a:schemeClr val="dk1"/>
+          </a:effectRef>
+          <a:fontRef idx="minor">
+            <a:schemeClr val="tx1"/>
+          </a:fontRef>
+        </p:style>
+      </p:cxnSp>
+      <p:cxnSp>
+        <p:nvCxnSpPr>
+          <p:cNvPr id="36" name="Straight Connector 35">
+            <a:extLst>
+              <a:ext uri="{FF2B5EF4-FFF2-40B4-BE49-F238E27FC236}">
+                <a16:creationId xmlns:a16="http://schemas.microsoft.com/office/drawing/2014/main" id="{6825AA6A-3C21-0994-254E-C48BA147B963}"/>
+              </a:ext>
+            </a:extLst>
+          </p:cNvPr>
+          <p:cNvCxnSpPr>
+            <a:cxnSpLocks/>
+            <a:stCxn id="10" idx="3"/>
+            <a:endCxn id="15" idx="1"/>
+          </p:cNvCxnSpPr>
+          <p:nvPr/>
+        </p:nvCxnSpPr>
+        <p:spPr>
+          <a:xfrm>
+            <a:off x="7900474" y="191471"/>
+            <a:ext cx="446723" cy="698694"/>
+          </a:xfrm>
+          <a:prstGeom prst="line">
+            <a:avLst/>
+          </a:prstGeom>
+          <a:ln w="9525"/>
+        </p:spPr>
+        <p:style>
+          <a:lnRef idx="1">
+            <a:schemeClr val="dk1"/>
+          </a:lnRef>
+          <a:fillRef idx="0">
+            <a:schemeClr val="dk1"/>
+          </a:fillRef>
+          <a:effectRef idx="0">
+            <a:schemeClr val="dk1"/>
+          </a:effectRef>
+          <a:fontRef idx="minor">
+            <a:schemeClr val="tx1"/>
+          </a:fontRef>
+        </p:style>
+      </p:cxnSp>
+      <p:sp>
+        <p:nvSpPr>
+          <p:cNvPr id="45" name="Rectangle 44">
+            <a:extLst>
+              <a:ext uri="{FF2B5EF4-FFF2-40B4-BE49-F238E27FC236}">
+                <a16:creationId xmlns:a16="http://schemas.microsoft.com/office/drawing/2014/main" id="{E787185A-417C-92BA-10D0-E3B803CED47B}"/>
+              </a:ext>
+            </a:extLst>
+          </p:cNvPr>
+          <p:cNvSpPr/>
+          <p:nvPr/>
+        </p:nvSpPr>
+        <p:spPr>
+          <a:xfrm>
+            <a:off x="6354845" y="2472568"/>
+            <a:ext cx="3534925" cy="279509"/>
+          </a:xfrm>
+          <a:prstGeom prst="rect">
+            <a:avLst/>
+          </a:prstGeom>
+          <a:solidFill>
+            <a:srgbClr val="00B0F0"/>
+          </a:solidFill>
+          <a:ln w="9525"/>
+        </p:spPr>
+        <p:style>
+          <a:lnRef idx="2">
+            <a:schemeClr val="accent1">
+              <a:shade val="15000"/>
+            </a:schemeClr>
+          </a:lnRef>
+          <a:fillRef idx="1">
+            <a:schemeClr val="accent1"/>
+          </a:fillRef>
+          <a:effectRef idx="0">
+            <a:schemeClr val="accent1"/>
+          </a:effectRef>
+          <a:fontRef idx="minor">
+            <a:schemeClr val="lt1"/>
+          </a:fontRef>
+        </p:style>
+        <p:txBody>
+          <a:bodyPr rtlCol="0" anchor="ctr"/>
+          <a:lstStyle/>
+          <a:p>
+            <a:pPr algn="ctr"/>
+            <a:r>
+              <a:rPr lang="en-US" sz="1300" dirty="0">
+                <a:solidFill>
+                  <a:schemeClr val="tx1"/>
+                </a:solidFill>
+              </a:rPr>
+              <a:t>Pairwise QC and discovery analysis 1</a:t>
+            </a:r>
+          </a:p>
+        </p:txBody>
+      </p:sp>
+      <p:sp>
+        <p:nvSpPr>
+          <p:cNvPr id="46" name="Rectangle 45">
+            <a:extLst>
+              <a:ext uri="{FF2B5EF4-FFF2-40B4-BE49-F238E27FC236}">
+                <a16:creationId xmlns:a16="http://schemas.microsoft.com/office/drawing/2014/main" id="{4F3F0DA2-0791-DBCA-27B0-21ABFCF0FB06}"/>
+              </a:ext>
+            </a:extLst>
+          </p:cNvPr>
+          <p:cNvSpPr/>
+          <p:nvPr/>
+        </p:nvSpPr>
+        <p:spPr>
+          <a:xfrm>
+            <a:off x="6354845" y="2821916"/>
+            <a:ext cx="3534925" cy="279509"/>
+          </a:xfrm>
+          <a:prstGeom prst="rect">
+            <a:avLst/>
+          </a:prstGeom>
+          <a:solidFill>
+            <a:srgbClr val="00B0F0"/>
+          </a:solidFill>
+          <a:ln w="9525"/>
+        </p:spPr>
+        <p:style>
+          <a:lnRef idx="2">
+            <a:schemeClr val="accent1">
+              <a:shade val="15000"/>
+            </a:schemeClr>
+          </a:lnRef>
+          <a:fillRef idx="1">
+            <a:schemeClr val="accent1"/>
+          </a:fillRef>
+          <a:effectRef idx="0">
+            <a:schemeClr val="accent1"/>
+          </a:effectRef>
+          <a:fontRef idx="minor">
+            <a:schemeClr val="lt1"/>
+          </a:fontRef>
+        </p:style>
+        <p:txBody>
+          <a:bodyPr rtlCol="0" anchor="ctr"/>
+          <a:lstStyle/>
+          <a:p>
+            <a:pPr algn="ctr"/>
+            <a:r>
+              <a:rPr lang="en-US" sz="1300" dirty="0">
+                <a:solidFill>
+                  <a:schemeClr val="tx1"/>
+                </a:solidFill>
+              </a:rPr>
+              <a:t>Pairwise QC and discovery analysis 2</a:t>
+            </a:r>
+          </a:p>
+        </p:txBody>
+      </p:sp>
+      <p:sp>
+        <p:nvSpPr>
+          <p:cNvPr id="47" name="Rectangle 46">
+            <a:extLst>
+              <a:ext uri="{FF2B5EF4-FFF2-40B4-BE49-F238E27FC236}">
+                <a16:creationId xmlns:a16="http://schemas.microsoft.com/office/drawing/2014/main" id="{D639D2B2-3090-349A-FEBD-18AD4669EDBE}"/>
+              </a:ext>
+            </a:extLst>
+          </p:cNvPr>
+          <p:cNvSpPr/>
+          <p:nvPr/>
+        </p:nvSpPr>
+        <p:spPr>
+          <a:xfrm>
+            <a:off x="6354846" y="3171264"/>
+            <a:ext cx="3534924" cy="279509"/>
+          </a:xfrm>
+          <a:prstGeom prst="rect">
+            <a:avLst/>
+          </a:prstGeom>
+          <a:solidFill>
+            <a:srgbClr val="00B0F0"/>
+          </a:solidFill>
+          <a:ln w="9525"/>
+        </p:spPr>
+        <p:style>
+          <a:lnRef idx="2">
+            <a:schemeClr val="accent1">
+              <a:shade val="15000"/>
+            </a:schemeClr>
+          </a:lnRef>
+          <a:fillRef idx="1">
+            <a:schemeClr val="accent1"/>
+          </a:fillRef>
+          <a:effectRef idx="0">
+            <a:schemeClr val="accent1"/>
+          </a:effectRef>
+          <a:fontRef idx="minor">
+            <a:schemeClr val="lt1"/>
+          </a:fontRef>
+        </p:style>
+        <p:txBody>
+          <a:bodyPr rtlCol="0" anchor="ctr"/>
+          <a:lstStyle/>
+          <a:p>
+            <a:pPr algn="ctr"/>
+            <a:r>
+              <a:rPr lang="en-US" sz="1300" dirty="0">
+                <a:solidFill>
+                  <a:schemeClr val="tx1"/>
+                </a:solidFill>
+              </a:rPr>
+              <a:t>Pairwise QC and discovery analysis 3</a:t>
+            </a:r>
+          </a:p>
+        </p:txBody>
+      </p:sp>
+      <p:sp>
+        <p:nvSpPr>
+          <p:cNvPr id="48" name="Rectangle 47">
+            <a:extLst>
+              <a:ext uri="{FF2B5EF4-FFF2-40B4-BE49-F238E27FC236}">
+                <a16:creationId xmlns:a16="http://schemas.microsoft.com/office/drawing/2014/main" id="{E2E9F8BA-0244-60F8-3EF2-735A95937408}"/>
+              </a:ext>
+            </a:extLst>
+          </p:cNvPr>
+          <p:cNvSpPr/>
+          <p:nvPr/>
+        </p:nvSpPr>
+        <p:spPr>
+          <a:xfrm>
+            <a:off x="6354845" y="3872304"/>
+            <a:ext cx="3534924" cy="279509"/>
+          </a:xfrm>
+          <a:prstGeom prst="rect">
+            <a:avLst/>
+          </a:prstGeom>
+          <a:solidFill>
+            <a:srgbClr val="00B0F0"/>
+          </a:solidFill>
+          <a:ln w="9525"/>
+        </p:spPr>
+        <p:style>
+          <a:lnRef idx="2">
+            <a:schemeClr val="accent1">
+              <a:shade val="15000"/>
+            </a:schemeClr>
+          </a:lnRef>
+          <a:fillRef idx="1">
+            <a:schemeClr val="accent1"/>
+          </a:fillRef>
+          <a:effectRef idx="0">
+            <a:schemeClr val="accent1"/>
+          </a:effectRef>
+          <a:fontRef idx="minor">
+            <a:schemeClr val="lt1"/>
+          </a:fontRef>
+        </p:style>
+        <p:txBody>
+          <a:bodyPr rtlCol="0" anchor="ctr"/>
+          <a:lstStyle/>
+          <a:p>
+            <a:pPr algn="ctr"/>
+            <a:r>
+              <a:rPr lang="en-US" sz="1300" dirty="0">
+                <a:solidFill>
+                  <a:schemeClr val="tx1"/>
+                </a:solidFill>
+              </a:rPr>
+              <a:t>Pairwise QC and discovery analysis </a:t>
+            </a:r>
+            <a:r>
+              <a:rPr lang="en-US" sz="1300" i="1" dirty="0">
+                <a:solidFill>
+                  <a:schemeClr val="tx1"/>
+                </a:solidFill>
+              </a:rPr>
+              <a:t>r</a:t>
+            </a:r>
+            <a:endParaRPr lang="en-US" sz="1300" dirty="0">
+              <a:solidFill>
+                <a:schemeClr val="tx1"/>
+              </a:solidFill>
+            </a:endParaRPr>
+          </a:p>
+        </p:txBody>
+      </p:sp>
+      <p:cxnSp>
+        <p:nvCxnSpPr>
+          <p:cNvPr id="104" name="Straight Connector 103">
+            <a:extLst>
+              <a:ext uri="{FF2B5EF4-FFF2-40B4-BE49-F238E27FC236}">
+                <a16:creationId xmlns:a16="http://schemas.microsoft.com/office/drawing/2014/main" id="{798893DA-068A-5571-4CB9-5DD164F8FBB2}"/>
+              </a:ext>
+            </a:extLst>
+          </p:cNvPr>
+          <p:cNvCxnSpPr>
+            <a:cxnSpLocks/>
+            <a:stCxn id="15" idx="3"/>
+          </p:cNvCxnSpPr>
+          <p:nvPr/>
+        </p:nvCxnSpPr>
+        <p:spPr>
+          <a:xfrm>
+            <a:off x="9889788" y="890165"/>
+            <a:ext cx="272690" cy="0"/>
+          </a:xfrm>
+          <a:prstGeom prst="line">
+            <a:avLst/>
+          </a:prstGeom>
+          <a:ln w="9525"/>
+        </p:spPr>
+        <p:style>
+          <a:lnRef idx="1">
+            <a:schemeClr val="dk1"/>
+          </a:lnRef>
+          <a:fillRef idx="0">
+            <a:schemeClr val="dk1"/>
+          </a:fillRef>
+          <a:effectRef idx="0">
+            <a:schemeClr val="dk1"/>
+          </a:effectRef>
+          <a:fontRef idx="minor">
+            <a:schemeClr val="tx1"/>
+          </a:fontRef>
+        </p:style>
+      </p:cxnSp>
+      <p:cxnSp>
+        <p:nvCxnSpPr>
+          <p:cNvPr id="106" name="Straight Connector 105">
+            <a:extLst>
+              <a:ext uri="{FF2B5EF4-FFF2-40B4-BE49-F238E27FC236}">
+                <a16:creationId xmlns:a16="http://schemas.microsoft.com/office/drawing/2014/main" id="{6F2BE7CE-67FE-5CE1-0362-A5A3F3292568}"/>
+              </a:ext>
+            </a:extLst>
+          </p:cNvPr>
+          <p:cNvCxnSpPr>
+            <a:cxnSpLocks/>
+          </p:cNvCxnSpPr>
+          <p:nvPr/>
+        </p:nvCxnSpPr>
+        <p:spPr>
+          <a:xfrm>
+            <a:off x="10162478" y="890164"/>
+            <a:ext cx="0" cy="1201162"/>
+          </a:xfrm>
+          <a:prstGeom prst="line">
+            <a:avLst/>
+          </a:prstGeom>
+          <a:ln w="9525"/>
+        </p:spPr>
+        <p:style>
+          <a:lnRef idx="1">
+            <a:schemeClr val="dk1"/>
+          </a:lnRef>
+          <a:fillRef idx="0">
+            <a:schemeClr val="dk1"/>
+          </a:fillRef>
+          <a:effectRef idx="0">
+            <a:schemeClr val="dk1"/>
+          </a:effectRef>
+          <a:fontRef idx="minor">
+            <a:schemeClr val="tx1"/>
+          </a:fontRef>
+        </p:style>
+      </p:cxnSp>
+      <p:cxnSp>
+        <p:nvCxnSpPr>
+          <p:cNvPr id="111" name="Straight Connector 110">
+            <a:extLst>
+              <a:ext uri="{FF2B5EF4-FFF2-40B4-BE49-F238E27FC236}">
+                <a16:creationId xmlns:a16="http://schemas.microsoft.com/office/drawing/2014/main" id="{3890AF78-C095-7EBE-871A-1A16CFCD06F8}"/>
+              </a:ext>
+            </a:extLst>
+          </p:cNvPr>
+          <p:cNvCxnSpPr>
+            <a:cxnSpLocks/>
+          </p:cNvCxnSpPr>
+          <p:nvPr/>
+        </p:nvCxnSpPr>
+        <p:spPr>
+          <a:xfrm flipH="1">
+            <a:off x="1688937" y="2091326"/>
+            <a:ext cx="8473541" cy="0"/>
+          </a:xfrm>
+          <a:prstGeom prst="line">
+            <a:avLst/>
+          </a:prstGeom>
+          <a:ln w="9525"/>
+        </p:spPr>
+        <p:style>
+          <a:lnRef idx="1">
+            <a:schemeClr val="dk1"/>
+          </a:lnRef>
+          <a:fillRef idx="0">
+            <a:schemeClr val="dk1"/>
+          </a:fillRef>
+          <a:effectRef idx="0">
+            <a:schemeClr val="dk1"/>
+          </a:effectRef>
+          <a:fontRef idx="minor">
+            <a:schemeClr val="tx1"/>
+          </a:fontRef>
+        </p:style>
+      </p:cxnSp>
+      <p:cxnSp>
+        <p:nvCxnSpPr>
+          <p:cNvPr id="116" name="Straight Connector 115">
+            <a:extLst>
+              <a:ext uri="{FF2B5EF4-FFF2-40B4-BE49-F238E27FC236}">
+                <a16:creationId xmlns:a16="http://schemas.microsoft.com/office/drawing/2014/main" id="{AF7947D4-13B0-5CD1-B42B-0949DCDB912E}"/>
+              </a:ext>
+            </a:extLst>
+          </p:cNvPr>
+          <p:cNvCxnSpPr>
+            <a:cxnSpLocks/>
+          </p:cNvCxnSpPr>
+          <p:nvPr/>
+        </p:nvCxnSpPr>
+        <p:spPr>
+          <a:xfrm>
+            <a:off x="1688939" y="2091326"/>
+            <a:ext cx="0" cy="1227707"/>
+          </a:xfrm>
+          <a:prstGeom prst="line">
+            <a:avLst/>
+          </a:prstGeom>
+          <a:ln w="9525"/>
+        </p:spPr>
+        <p:style>
+          <a:lnRef idx="1">
+            <a:schemeClr val="dk1"/>
+          </a:lnRef>
+          <a:fillRef idx="0">
+            <a:schemeClr val="dk1"/>
+          </a:fillRef>
+          <a:effectRef idx="0">
+            <a:schemeClr val="dk1"/>
+          </a:effectRef>
+          <a:fontRef idx="minor">
+            <a:schemeClr val="tx1"/>
+          </a:fontRef>
+        </p:style>
+      </p:cxnSp>
+      <p:cxnSp>
+        <p:nvCxnSpPr>
+          <p:cNvPr id="118" name="Straight Connector 117">
+            <a:extLst>
+              <a:ext uri="{FF2B5EF4-FFF2-40B4-BE49-F238E27FC236}">
+                <a16:creationId xmlns:a16="http://schemas.microsoft.com/office/drawing/2014/main" id="{CE572C77-6474-CA9A-C842-EC2562EAEDD4}"/>
+              </a:ext>
+            </a:extLst>
+          </p:cNvPr>
+          <p:cNvCxnSpPr>
+            <a:cxnSpLocks/>
+            <a:stCxn id="37" idx="3"/>
+            <a:endCxn id="45" idx="1"/>
+          </p:cNvCxnSpPr>
+          <p:nvPr/>
+        </p:nvCxnSpPr>
+        <p:spPr>
+          <a:xfrm flipV="1">
+            <a:off x="5735769" y="2612323"/>
+            <a:ext cx="619076" cy="714911"/>
+          </a:xfrm>
+          <a:prstGeom prst="line">
+            <a:avLst/>
+          </a:prstGeom>
+          <a:ln w="9525">
+            <a:tailEnd type="triangle"/>
+          </a:ln>
+        </p:spPr>
+        <p:style>
+          <a:lnRef idx="1">
+            <a:schemeClr val="dk1"/>
+          </a:lnRef>
+          <a:fillRef idx="0">
+            <a:schemeClr val="dk1"/>
+          </a:fillRef>
+          <a:effectRef idx="0">
+            <a:schemeClr val="dk1"/>
+          </a:effectRef>
+          <a:fontRef idx="minor">
+            <a:schemeClr val="tx1"/>
+          </a:fontRef>
+        </p:style>
+      </p:cxnSp>
+      <p:cxnSp>
+        <p:nvCxnSpPr>
+          <p:cNvPr id="123" name="Straight Connector 122">
+            <a:extLst>
+              <a:ext uri="{FF2B5EF4-FFF2-40B4-BE49-F238E27FC236}">
+                <a16:creationId xmlns:a16="http://schemas.microsoft.com/office/drawing/2014/main" id="{7180B38A-AAFE-94A1-36CC-376579B8CD5D}"/>
+              </a:ext>
+            </a:extLst>
+          </p:cNvPr>
+          <p:cNvCxnSpPr>
+            <a:cxnSpLocks/>
+            <a:stCxn id="37" idx="3"/>
+            <a:endCxn id="46" idx="1"/>
+          </p:cNvCxnSpPr>
+          <p:nvPr/>
+        </p:nvCxnSpPr>
+        <p:spPr>
+          <a:xfrm flipV="1">
+            <a:off x="5735769" y="2961671"/>
+            <a:ext cx="619076" cy="365563"/>
+          </a:xfrm>
+          <a:prstGeom prst="line">
+            <a:avLst/>
+          </a:prstGeom>
+          <a:ln w="9525">
+            <a:tailEnd type="triangle"/>
+          </a:ln>
+        </p:spPr>
+        <p:style>
+          <a:lnRef idx="1">
+            <a:schemeClr val="dk1"/>
+          </a:lnRef>
+          <a:fillRef idx="0">
+            <a:schemeClr val="dk1"/>
+          </a:fillRef>
+          <a:effectRef idx="0">
+            <a:schemeClr val="dk1"/>
+          </a:effectRef>
+          <a:fontRef idx="minor">
+            <a:schemeClr val="tx1"/>
+          </a:fontRef>
+        </p:style>
+      </p:cxnSp>
+      <p:cxnSp>
+        <p:nvCxnSpPr>
+          <p:cNvPr id="130" name="Straight Connector 129">
+            <a:extLst>
+              <a:ext uri="{FF2B5EF4-FFF2-40B4-BE49-F238E27FC236}">
+                <a16:creationId xmlns:a16="http://schemas.microsoft.com/office/drawing/2014/main" id="{BC455AA2-F547-8311-02BD-4DA9FD7472A9}"/>
+              </a:ext>
+            </a:extLst>
+          </p:cNvPr>
+          <p:cNvCxnSpPr>
+            <a:cxnSpLocks/>
+            <a:stCxn id="37" idx="3"/>
+            <a:endCxn id="47" idx="1"/>
+          </p:cNvCxnSpPr>
+          <p:nvPr/>
+        </p:nvCxnSpPr>
+        <p:spPr>
+          <a:xfrm flipV="1">
+            <a:off x="5735769" y="3311019"/>
+            <a:ext cx="619077" cy="16215"/>
+          </a:xfrm>
+          <a:prstGeom prst="line">
+            <a:avLst/>
+          </a:prstGeom>
+          <a:ln w="9525">
+            <a:tailEnd type="triangle"/>
+          </a:ln>
+        </p:spPr>
+        <p:style>
+          <a:lnRef idx="1">
+            <a:schemeClr val="dk1"/>
+          </a:lnRef>
+          <a:fillRef idx="0">
+            <a:schemeClr val="dk1"/>
+          </a:fillRef>
+          <a:effectRef idx="0">
+            <a:schemeClr val="dk1"/>
+          </a:effectRef>
+          <a:fontRef idx="minor">
+            <a:schemeClr val="tx1"/>
+          </a:fontRef>
+        </p:style>
+      </p:cxnSp>
+      <p:cxnSp>
+        <p:nvCxnSpPr>
+          <p:cNvPr id="138" name="Straight Connector 137">
+            <a:extLst>
+              <a:ext uri="{FF2B5EF4-FFF2-40B4-BE49-F238E27FC236}">
+                <a16:creationId xmlns:a16="http://schemas.microsoft.com/office/drawing/2014/main" id="{2DE9EFBF-21A0-AA36-3CD4-4253C41B7CBC}"/>
+              </a:ext>
+            </a:extLst>
+          </p:cNvPr>
+          <p:cNvCxnSpPr>
+            <a:cxnSpLocks/>
+            <a:stCxn id="37" idx="3"/>
+            <a:endCxn id="48" idx="1"/>
+          </p:cNvCxnSpPr>
+          <p:nvPr/>
+        </p:nvCxnSpPr>
+        <p:spPr>
+          <a:xfrm>
+            <a:off x="5735769" y="3327234"/>
+            <a:ext cx="619076" cy="684825"/>
+          </a:xfrm>
+          <a:prstGeom prst="line">
+            <a:avLst/>
+          </a:prstGeom>
+          <a:ln w="9525">
+            <a:tailEnd type="triangle"/>
+          </a:ln>
+        </p:spPr>
+        <p:style>
+          <a:lnRef idx="1">
+            <a:schemeClr val="dk1"/>
+          </a:lnRef>
+          <a:fillRef idx="0">
+            <a:schemeClr val="dk1"/>
+          </a:fillRef>
+          <a:effectRef idx="0">
+            <a:schemeClr val="dk1"/>
+          </a:effectRef>
+          <a:fontRef idx="minor">
+            <a:schemeClr val="tx1"/>
+          </a:fontRef>
+        </p:style>
+      </p:cxnSp>
+      <p:sp>
+        <p:nvSpPr>
+          <p:cNvPr id="171" name="TextBox 170">
+            <a:extLst>
+              <a:ext uri="{FF2B5EF4-FFF2-40B4-BE49-F238E27FC236}">
+                <a16:creationId xmlns:a16="http://schemas.microsoft.com/office/drawing/2014/main" id="{3AD061C8-4735-2DAC-546D-BC6843E650F7}"/>
+              </a:ext>
+            </a:extLst>
+          </p:cNvPr>
+          <p:cNvSpPr txBox="1"/>
+          <p:nvPr/>
+        </p:nvSpPr>
+        <p:spPr>
+          <a:xfrm rot="5400000">
+            <a:off x="7014693" y="1069563"/>
+            <a:ext cx="343364" cy="369332"/>
+          </a:xfrm>
+          <a:prstGeom prst="rect">
+            <a:avLst/>
+          </a:prstGeom>
+          <a:noFill/>
+        </p:spPr>
+        <p:txBody>
+          <a:bodyPr wrap="none" rtlCol="0">
+            <a:spAutoFit/>
+          </a:bodyPr>
+          <a:lstStyle/>
+          <a:p>
+            <a:r>
+              <a:rPr lang="en-US" dirty="0"/>
+              <a:t>…</a:t>
+            </a:r>
+          </a:p>
+        </p:txBody>
+      </p:sp>
+      <p:sp>
+        <p:nvSpPr>
+          <p:cNvPr id="172" name="TextBox 171">
+            <a:extLst>
+              <a:ext uri="{FF2B5EF4-FFF2-40B4-BE49-F238E27FC236}">
+                <a16:creationId xmlns:a16="http://schemas.microsoft.com/office/drawing/2014/main" id="{6834AADD-47BE-DC93-00DE-B77F8F6F39C5}"/>
+              </a:ext>
+            </a:extLst>
+          </p:cNvPr>
+          <p:cNvSpPr txBox="1"/>
+          <p:nvPr/>
+        </p:nvSpPr>
+        <p:spPr>
+          <a:xfrm rot="5400000">
+            <a:off x="8084820" y="3505156"/>
+            <a:ext cx="390555" cy="369332"/>
+          </a:xfrm>
+          <a:prstGeom prst="rect">
+            <a:avLst/>
+          </a:prstGeom>
+          <a:noFill/>
+        </p:spPr>
+        <p:txBody>
+          <a:bodyPr wrap="square" rtlCol="0">
+            <a:spAutoFit/>
+          </a:bodyPr>
+          <a:lstStyle/>
+          <a:p>
+            <a:r>
+              <a:rPr lang="en-US" dirty="0"/>
+              <a:t>…</a:t>
+            </a:r>
+          </a:p>
+        </p:txBody>
+      </p:sp>
+      <p:sp>
+        <p:nvSpPr>
+          <p:cNvPr id="175" name="TextBox 174">
+            <a:extLst>
+              <a:ext uri="{FF2B5EF4-FFF2-40B4-BE49-F238E27FC236}">
+                <a16:creationId xmlns:a16="http://schemas.microsoft.com/office/drawing/2014/main" id="{1996ECE0-A1E0-9D94-1835-42DBD7F8A99A}"/>
+              </a:ext>
+            </a:extLst>
+          </p:cNvPr>
+          <p:cNvSpPr txBox="1"/>
+          <p:nvPr/>
+        </p:nvSpPr>
+        <p:spPr>
+          <a:xfrm>
+            <a:off x="6802527" y="1737526"/>
+            <a:ext cx="647228" cy="292388"/>
+          </a:xfrm>
+          <a:prstGeom prst="rect">
+            <a:avLst/>
+          </a:prstGeom>
+          <a:noFill/>
+        </p:spPr>
+        <p:txBody>
+          <a:bodyPr wrap="none" rtlCol="0">
+            <a:spAutoFit/>
+          </a:bodyPr>
+          <a:lstStyle/>
+          <a:p>
+            <a:r>
+              <a:rPr lang="en-US" sz="1300" dirty="0">
+                <a:solidFill>
+                  <a:schemeClr val="bg1">
+                    <a:lumMod val="50000"/>
+                  </a:schemeClr>
+                </a:solidFill>
+              </a:rPr>
+              <a:t>scatter</a:t>
+            </a:r>
+          </a:p>
+        </p:txBody>
+      </p:sp>
+      <p:sp>
+        <p:nvSpPr>
+          <p:cNvPr id="176" name="TextBox 175">
+            <a:extLst>
+              <a:ext uri="{FF2B5EF4-FFF2-40B4-BE49-F238E27FC236}">
+                <a16:creationId xmlns:a16="http://schemas.microsoft.com/office/drawing/2014/main" id="{DAC74A6D-2096-104E-E1C7-9F9C3809B49C}"/>
+              </a:ext>
+            </a:extLst>
+          </p:cNvPr>
+          <p:cNvSpPr txBox="1"/>
+          <p:nvPr/>
+        </p:nvSpPr>
+        <p:spPr>
+          <a:xfrm>
+            <a:off x="8841577" y="1146420"/>
+            <a:ext cx="624082" cy="292388"/>
+          </a:xfrm>
+          <a:prstGeom prst="rect">
+            <a:avLst/>
+          </a:prstGeom>
+          <a:noFill/>
+        </p:spPr>
+        <p:txBody>
+          <a:bodyPr wrap="none" rtlCol="0">
+            <a:spAutoFit/>
+          </a:bodyPr>
+          <a:lstStyle/>
+          <a:p>
+            <a:r>
+              <a:rPr lang="en-US" sz="1300" dirty="0">
+                <a:solidFill>
+                  <a:schemeClr val="bg1">
+                    <a:lumMod val="50000"/>
+                  </a:schemeClr>
+                </a:solidFill>
+              </a:rPr>
+              <a:t>gather</a:t>
+            </a:r>
+          </a:p>
+        </p:txBody>
+      </p:sp>
+      <p:sp>
+        <p:nvSpPr>
+          <p:cNvPr id="177" name="TextBox 176">
+            <a:extLst>
+              <a:ext uri="{FF2B5EF4-FFF2-40B4-BE49-F238E27FC236}">
+                <a16:creationId xmlns:a16="http://schemas.microsoft.com/office/drawing/2014/main" id="{1D2D3C0B-D257-89CA-4C87-11F12BEDDD40}"/>
+              </a:ext>
+            </a:extLst>
+          </p:cNvPr>
+          <p:cNvSpPr txBox="1"/>
+          <p:nvPr/>
+        </p:nvSpPr>
+        <p:spPr>
+          <a:xfrm>
+            <a:off x="7897436" y="4151813"/>
+            <a:ext cx="647228" cy="292388"/>
+          </a:xfrm>
+          <a:prstGeom prst="rect">
+            <a:avLst/>
+          </a:prstGeom>
+          <a:noFill/>
+        </p:spPr>
+        <p:txBody>
+          <a:bodyPr wrap="none" rtlCol="0">
+            <a:spAutoFit/>
+          </a:bodyPr>
+          <a:lstStyle/>
+          <a:p>
+            <a:r>
+              <a:rPr lang="en-US" sz="1300" dirty="0">
+                <a:solidFill>
+                  <a:schemeClr val="bg1">
+                    <a:lumMod val="50000"/>
+                  </a:schemeClr>
+                </a:solidFill>
+              </a:rPr>
+              <a:t>scatter</a:t>
+            </a:r>
+          </a:p>
+        </p:txBody>
+      </p:sp>
+      <p:sp>
+        <p:nvSpPr>
+          <p:cNvPr id="2" name="Rectangle 1">
+            <a:extLst>
+              <a:ext uri="{FF2B5EF4-FFF2-40B4-BE49-F238E27FC236}">
+                <a16:creationId xmlns:a16="http://schemas.microsoft.com/office/drawing/2014/main" id="{EF616D6F-F374-DAC7-DB6D-D1BB7F4D6771}"/>
+              </a:ext>
+            </a:extLst>
+          </p:cNvPr>
+          <p:cNvSpPr/>
+          <p:nvPr/>
+        </p:nvSpPr>
+        <p:spPr>
+          <a:xfrm>
+            <a:off x="2261751" y="3038667"/>
+            <a:ext cx="1542591" cy="559293"/>
+          </a:xfrm>
+          <a:prstGeom prst="rect">
+            <a:avLst/>
+          </a:prstGeom>
+          <a:solidFill>
+            <a:srgbClr val="00B0F0"/>
+          </a:solidFill>
+          <a:ln w="9525"/>
+        </p:spPr>
+        <p:style>
+          <a:lnRef idx="2">
+            <a:schemeClr val="accent1">
+              <a:shade val="15000"/>
+            </a:schemeClr>
+          </a:lnRef>
+          <a:fillRef idx="1">
+            <a:schemeClr val="accent1"/>
+          </a:fillRef>
+          <a:effectRef idx="0">
+            <a:schemeClr val="accent1"/>
+          </a:effectRef>
+          <a:fontRef idx="minor">
+            <a:schemeClr val="lt1"/>
+          </a:fontRef>
+        </p:style>
+        <p:txBody>
+          <a:bodyPr rtlCol="0" anchor="ctr"/>
+          <a:lstStyle/>
+          <a:p>
+            <a:pPr algn="ctr"/>
+            <a:r>
+              <a:rPr lang="en-US" sz="1300" dirty="0">
+                <a:solidFill>
+                  <a:schemeClr val="tx1"/>
+                </a:solidFill>
+              </a:rPr>
+              <a:t>Run cellwise QC</a:t>
+            </a:r>
+          </a:p>
+        </p:txBody>
+      </p:sp>
+      <p:sp>
+        <p:nvSpPr>
+          <p:cNvPr id="37" name="Rectangle 36">
+            <a:extLst>
+              <a:ext uri="{FF2B5EF4-FFF2-40B4-BE49-F238E27FC236}">
+                <a16:creationId xmlns:a16="http://schemas.microsoft.com/office/drawing/2014/main" id="{D52813D9-A2FB-4403-50C0-E95390F9AD49}"/>
+              </a:ext>
+            </a:extLst>
+          </p:cNvPr>
+          <p:cNvSpPr/>
+          <p:nvPr/>
+        </p:nvSpPr>
+        <p:spPr>
+          <a:xfrm>
+            <a:off x="4193178" y="3047587"/>
+            <a:ext cx="1542591" cy="559293"/>
+          </a:xfrm>
+          <a:prstGeom prst="rect">
+            <a:avLst/>
+          </a:prstGeom>
+          <a:solidFill>
+            <a:srgbClr val="00B0F0"/>
+          </a:solidFill>
+          <a:ln w="9525"/>
+        </p:spPr>
+        <p:style>
+          <a:lnRef idx="2">
+            <a:schemeClr val="accent1">
+              <a:shade val="15000"/>
+            </a:schemeClr>
+          </a:lnRef>
+          <a:fillRef idx="1">
+            <a:schemeClr val="accent1"/>
+          </a:fillRef>
+          <a:effectRef idx="0">
+            <a:schemeClr val="accent1"/>
+          </a:effectRef>
+          <a:fontRef idx="minor">
+            <a:schemeClr val="lt1"/>
+          </a:fontRef>
+        </p:style>
+        <p:txBody>
+          <a:bodyPr rtlCol="0" anchor="ctr"/>
+          <a:lstStyle/>
+          <a:p>
+            <a:pPr algn="ctr"/>
+            <a:r>
+              <a:rPr lang="en-US" sz="1300" dirty="0">
+                <a:solidFill>
+                  <a:schemeClr val="tx1"/>
+                </a:solidFill>
+              </a:rPr>
+              <a:t>Prepare </a:t>
+            </a:r>
+            <a:r>
+              <a:rPr lang="en-US" sz="1300" i="1" dirty="0">
+                <a:solidFill>
+                  <a:schemeClr val="tx1"/>
+                </a:solidFill>
+              </a:rPr>
+              <a:t>trans </a:t>
+            </a:r>
+            <a:r>
+              <a:rPr lang="en-US" sz="1300" dirty="0">
+                <a:solidFill>
+                  <a:schemeClr val="tx1"/>
+                </a:solidFill>
+              </a:rPr>
+              <a:t>discovery analysis</a:t>
+            </a:r>
+          </a:p>
+        </p:txBody>
+      </p:sp>
+      <p:sp>
+        <p:nvSpPr>
+          <p:cNvPr id="38" name="Rectangle 37">
+            <a:extLst>
+              <a:ext uri="{FF2B5EF4-FFF2-40B4-BE49-F238E27FC236}">
+                <a16:creationId xmlns:a16="http://schemas.microsoft.com/office/drawing/2014/main" id="{DB934FE0-B39A-36D8-CD5A-DE6721489089}"/>
+              </a:ext>
+            </a:extLst>
+          </p:cNvPr>
+          <p:cNvSpPr/>
+          <p:nvPr/>
+        </p:nvSpPr>
+        <p:spPr>
+          <a:xfrm>
+            <a:off x="4198987" y="610911"/>
+            <a:ext cx="1542591" cy="559293"/>
+          </a:xfrm>
+          <a:prstGeom prst="rect">
+            <a:avLst/>
+          </a:prstGeom>
+          <a:solidFill>
+            <a:srgbClr val="00B0F0"/>
+          </a:solidFill>
+          <a:ln w="9525"/>
+        </p:spPr>
+        <p:style>
+          <a:lnRef idx="2">
+            <a:schemeClr val="accent1">
+              <a:shade val="15000"/>
+            </a:schemeClr>
+          </a:lnRef>
+          <a:fillRef idx="1">
+            <a:schemeClr val="accent1"/>
+          </a:fillRef>
+          <a:effectRef idx="0">
+            <a:schemeClr val="accent1"/>
+          </a:effectRef>
+          <a:fontRef idx="minor">
+            <a:schemeClr val="lt1"/>
+          </a:fontRef>
+        </p:style>
+        <p:txBody>
+          <a:bodyPr rtlCol="0" anchor="ctr"/>
+          <a:lstStyle/>
+          <a:p>
+            <a:pPr algn="ctr"/>
+            <a:r>
+              <a:rPr lang="en-US" sz="1300" dirty="0">
+                <a:solidFill>
+                  <a:schemeClr val="tx1"/>
+                </a:solidFill>
+              </a:rPr>
+              <a:t>Prepare assign gRNAs</a:t>
+            </a:r>
+          </a:p>
+        </p:txBody>
+      </p:sp>
+      <p:cxnSp>
+        <p:nvCxnSpPr>
+          <p:cNvPr id="39" name="Straight Connector 38">
+            <a:extLst>
+              <a:ext uri="{FF2B5EF4-FFF2-40B4-BE49-F238E27FC236}">
+                <a16:creationId xmlns:a16="http://schemas.microsoft.com/office/drawing/2014/main" id="{75006AD3-1A59-98DA-02E2-E6FBBC9B5220}"/>
+              </a:ext>
+            </a:extLst>
+          </p:cNvPr>
+          <p:cNvCxnSpPr>
+            <a:cxnSpLocks/>
+            <a:endCxn id="2" idx="1"/>
+          </p:cNvCxnSpPr>
+          <p:nvPr/>
+        </p:nvCxnSpPr>
+        <p:spPr>
+          <a:xfrm flipV="1">
+            <a:off x="1688937" y="3318314"/>
+            <a:ext cx="572814" cy="4541"/>
+          </a:xfrm>
+          <a:prstGeom prst="line">
+            <a:avLst/>
+          </a:prstGeom>
+          <a:ln w="9525">
+            <a:tailEnd type="triangle"/>
+          </a:ln>
+        </p:spPr>
+        <p:style>
+          <a:lnRef idx="1">
+            <a:schemeClr val="dk1"/>
+          </a:lnRef>
+          <a:fillRef idx="0">
+            <a:schemeClr val="dk1"/>
+          </a:fillRef>
+          <a:effectRef idx="0">
+            <a:schemeClr val="dk1"/>
+          </a:effectRef>
+          <a:fontRef idx="minor">
+            <a:schemeClr val="tx1"/>
+          </a:fontRef>
+        </p:style>
+      </p:cxnSp>
+      <p:cxnSp>
+        <p:nvCxnSpPr>
+          <p:cNvPr id="66" name="Straight Connector 65">
+            <a:extLst>
+              <a:ext uri="{FF2B5EF4-FFF2-40B4-BE49-F238E27FC236}">
+                <a16:creationId xmlns:a16="http://schemas.microsoft.com/office/drawing/2014/main" id="{51303A17-CDD3-C0D8-73E1-10A344E4E1DF}"/>
+              </a:ext>
+            </a:extLst>
+          </p:cNvPr>
+          <p:cNvCxnSpPr>
+            <a:cxnSpLocks/>
+            <a:stCxn id="2" idx="3"/>
+            <a:endCxn id="37" idx="1"/>
+          </p:cNvCxnSpPr>
+          <p:nvPr/>
+        </p:nvCxnSpPr>
+        <p:spPr>
+          <a:xfrm>
+            <a:off x="3804342" y="3318314"/>
+            <a:ext cx="388836" cy="8920"/>
+          </a:xfrm>
+          <a:prstGeom prst="line">
+            <a:avLst/>
+          </a:prstGeom>
+          <a:ln w="9525">
+            <a:tailEnd type="triangle"/>
+          </a:ln>
+        </p:spPr>
+        <p:style>
+          <a:lnRef idx="1">
+            <a:schemeClr val="dk1"/>
+          </a:lnRef>
+          <a:fillRef idx="0">
+            <a:schemeClr val="dk1"/>
+          </a:fillRef>
+          <a:effectRef idx="0">
+            <a:schemeClr val="dk1"/>
+          </a:effectRef>
+          <a:fontRef idx="minor">
+            <a:schemeClr val="tx1"/>
+          </a:fontRef>
+        </p:style>
+      </p:cxnSp>
+      <p:cxnSp>
+        <p:nvCxnSpPr>
+          <p:cNvPr id="70" name="Straight Connector 69">
+            <a:extLst>
+              <a:ext uri="{FF2B5EF4-FFF2-40B4-BE49-F238E27FC236}">
+                <a16:creationId xmlns:a16="http://schemas.microsoft.com/office/drawing/2014/main" id="{158C67C0-AD07-0297-C100-F04402D12297}"/>
+              </a:ext>
+            </a:extLst>
+          </p:cNvPr>
+          <p:cNvCxnSpPr>
+            <a:cxnSpLocks/>
+            <a:stCxn id="7" idx="3"/>
+            <a:endCxn id="38" idx="1"/>
+          </p:cNvCxnSpPr>
+          <p:nvPr/>
+        </p:nvCxnSpPr>
+        <p:spPr>
+          <a:xfrm flipV="1">
+            <a:off x="3804342" y="890558"/>
+            <a:ext cx="394645" cy="1800"/>
+          </a:xfrm>
+          <a:prstGeom prst="line">
+            <a:avLst/>
+          </a:prstGeom>
+          <a:ln w="9525">
+            <a:tailEnd type="triangle"/>
+          </a:ln>
+        </p:spPr>
+        <p:style>
+          <a:lnRef idx="1">
+            <a:schemeClr val="dk1"/>
+          </a:lnRef>
+          <a:fillRef idx="0">
+            <a:schemeClr val="dk1"/>
+          </a:fillRef>
+          <a:effectRef idx="0">
+            <a:schemeClr val="dk1"/>
+          </a:effectRef>
+          <a:fontRef idx="minor">
+            <a:schemeClr val="tx1"/>
+          </a:fontRef>
+        </p:style>
+      </p:cxnSp>
+    </p:spTree>
+    <p:extLst>
+      <p:ext uri="{BB962C8B-B14F-4D97-AF65-F5344CB8AC3E}">
+        <p14:creationId xmlns:p14="http://schemas.microsoft.com/office/powerpoint/2010/main" val="3942542760"/>
       </p:ext>
     </p:extLst>
   </p:cSld>

</xml_diff>